<commit_message>
add metodologia ao ppt
</commit_message>
<xml_diff>
--- a/HSOsprint2.pptx
+++ b/HSOsprint2.pptx
@@ -10,15 +10,16 @@
     <p:sldId id="258" r:id="rId4"/>
     <p:sldId id="259" r:id="rId5"/>
     <p:sldId id="260" r:id="rId6"/>
-    <p:sldId id="261" r:id="rId7"/>
-    <p:sldId id="264" r:id="rId8"/>
-    <p:sldId id="265" r:id="rId9"/>
-    <p:sldId id="262" r:id="rId10"/>
-    <p:sldId id="263" r:id="rId11"/>
-    <p:sldId id="266" r:id="rId12"/>
-    <p:sldId id="269" r:id="rId13"/>
-    <p:sldId id="267" r:id="rId14"/>
-    <p:sldId id="268" r:id="rId15"/>
+    <p:sldId id="264" r:id="rId7"/>
+    <p:sldId id="265" r:id="rId8"/>
+    <p:sldId id="262" r:id="rId9"/>
+    <p:sldId id="263" r:id="rId10"/>
+    <p:sldId id="266" r:id="rId11"/>
+    <p:sldId id="261" r:id="rId12"/>
+    <p:sldId id="270" r:id="rId13"/>
+    <p:sldId id="269" r:id="rId14"/>
+    <p:sldId id="267" r:id="rId15"/>
+    <p:sldId id="268" r:id="rId16"/>
   </p:sldIdLst>
   <p:sldSz cx="12192000" cy="6858000"/>
   <p:notesSz cx="7559675" cy="10691813"/>
@@ -117,6 +118,11 @@
       </a:defRPr>
     </a:lvl9pPr>
   </p:defaultTextStyle>
+  <p:extLst>
+    <p:ext uri="{EFAFB233-063F-42B5-8137-9DF3F51BA10A}">
+      <p15:sldGuideLst xmlns:p15="http://schemas.microsoft.com/office/powerpoint/2012/main"/>
+    </p:ext>
+  </p:extLst>
 </p:presentation>
 </file>
 
@@ -2248,7 +2254,7 @@
     <p:bg>
       <p:bgPr>
         <a:solidFill>
-          <a:schemeClr val="accent1"/>
+          <a:srgbClr val="FFFFFF"/>
         </a:solidFill>
         <a:effectLst/>
       </p:bgPr>
@@ -2267,76 +2273,262 @@
           <a:chExt cx="0" cy="0"/>
         </a:xfrm>
       </p:grpSpPr>
+      <p:sp>
+        <p:nvSpPr>
+          <p:cNvPr id="115" name="CustomShape 1"/>
+          <p:cNvSpPr/>
+          <p:nvPr/>
+        </p:nvSpPr>
+        <p:spPr>
+          <a:xfrm>
+            <a:off x="6847920" y="1636560"/>
+            <a:ext cx="3837240" cy="3837240"/>
+          </a:xfrm>
+          <a:prstGeom prst="ellipse">
+            <a:avLst/>
+          </a:prstGeom>
+          <a:solidFill>
+            <a:srgbClr val="2F50A1">
+              <a:alpha val="83000"/>
+            </a:srgbClr>
+          </a:solidFill>
+          <a:ln w="76320">
+            <a:noFill/>
+          </a:ln>
+          <a:effectLst>
+            <a:outerShdw blurRad="40000" dist="23040" dir="5400000" rotWithShape="0">
+              <a:srgbClr val="000000">
+                <a:alpha val="35000"/>
+              </a:srgbClr>
+            </a:outerShdw>
+          </a:effectLst>
+        </p:spPr>
+        <p:style>
+          <a:lnRef idx="1">
+            <a:schemeClr val="accent1"/>
+          </a:lnRef>
+          <a:fillRef idx="3">
+            <a:schemeClr val="accent1"/>
+          </a:fillRef>
+          <a:effectRef idx="2">
+            <a:schemeClr val="accent1"/>
+          </a:effectRef>
+          <a:fontRef idx="minor"/>
+        </p:style>
+      </p:sp>
+      <p:sp>
+        <p:nvSpPr>
+          <p:cNvPr id="116" name="CustomShape 2"/>
+          <p:cNvSpPr/>
+          <p:nvPr/>
+        </p:nvSpPr>
+        <p:spPr>
+          <a:xfrm>
+            <a:off x="1877760" y="1566000"/>
+            <a:ext cx="3060720" cy="3060720"/>
+          </a:xfrm>
+          <a:prstGeom prst="ellipse">
+            <a:avLst/>
+          </a:prstGeom>
+          <a:solidFill>
+            <a:srgbClr val="D9D9D9"/>
+          </a:solidFill>
+          <a:ln w="76320">
+            <a:noFill/>
+          </a:ln>
+          <a:effectLst>
+            <a:outerShdw blurRad="40000" dist="23040" dir="5400000" rotWithShape="0">
+              <a:srgbClr val="000000">
+                <a:alpha val="35000"/>
+              </a:srgbClr>
+            </a:outerShdw>
+          </a:effectLst>
+        </p:spPr>
+        <p:style>
+          <a:lnRef idx="1">
+            <a:schemeClr val="accent1"/>
+          </a:lnRef>
+          <a:fillRef idx="3">
+            <a:schemeClr val="accent1"/>
+          </a:fillRef>
+          <a:effectRef idx="2">
+            <a:schemeClr val="accent1"/>
+          </a:effectRef>
+          <a:fontRef idx="minor"/>
+        </p:style>
+      </p:sp>
+      <p:sp>
+        <p:nvSpPr>
+          <p:cNvPr id="117" name="CustomShape 3"/>
+          <p:cNvSpPr/>
+          <p:nvPr/>
+        </p:nvSpPr>
+        <p:spPr>
+          <a:xfrm>
+            <a:off x="4337640" y="3255480"/>
+            <a:ext cx="2483280" cy="2483280"/>
+          </a:xfrm>
+          <a:prstGeom prst="ellipse">
+            <a:avLst/>
+          </a:prstGeom>
+          <a:solidFill>
+            <a:srgbClr val="2F50A1"/>
+          </a:solidFill>
+          <a:ln w="76320">
+            <a:noFill/>
+          </a:ln>
+          <a:effectLst>
+            <a:outerShdw blurRad="40000" dist="23040" dir="5400000" rotWithShape="0">
+              <a:srgbClr val="000000">
+                <a:alpha val="35000"/>
+              </a:srgbClr>
+            </a:outerShdw>
+          </a:effectLst>
+        </p:spPr>
+        <p:style>
+          <a:lnRef idx="1">
+            <a:schemeClr val="accent1"/>
+          </a:lnRef>
+          <a:fillRef idx="3">
+            <a:schemeClr val="accent1"/>
+          </a:fillRef>
+          <a:effectRef idx="2">
+            <a:schemeClr val="accent1"/>
+          </a:effectRef>
+          <a:fontRef idx="minor"/>
+        </p:style>
+      </p:sp>
+      <p:sp>
+        <p:nvSpPr>
+          <p:cNvPr id="118" name="CustomShape 4"/>
+          <p:cNvSpPr/>
+          <p:nvPr/>
+        </p:nvSpPr>
+        <p:spPr>
+          <a:xfrm>
+            <a:off x="5350680" y="1434960"/>
+            <a:ext cx="2030760" cy="2030760"/>
+          </a:xfrm>
+          <a:prstGeom prst="ellipse">
+            <a:avLst/>
+          </a:prstGeom>
+          <a:solidFill>
+            <a:srgbClr val="2F50A1"/>
+          </a:solidFill>
+          <a:ln w="76320">
+            <a:noFill/>
+          </a:ln>
+          <a:effectLst>
+            <a:outerShdw blurRad="40000" dist="23040" dir="5400000" rotWithShape="0">
+              <a:srgbClr val="000000">
+                <a:alpha val="35000"/>
+              </a:srgbClr>
+            </a:outerShdw>
+          </a:effectLst>
+        </p:spPr>
+        <p:style>
+          <a:lnRef idx="1">
+            <a:schemeClr val="accent1"/>
+          </a:lnRef>
+          <a:fillRef idx="3">
+            <a:schemeClr val="accent1"/>
+          </a:fillRef>
+          <a:effectRef idx="2">
+            <a:schemeClr val="accent1"/>
+          </a:effectRef>
+          <a:fontRef idx="minor"/>
+        </p:style>
+      </p:sp>
       <p:pic>
         <p:nvPicPr>
-          <p:cNvPr id="3" name="Imagem 2">
-            <a:extLst>
-              <a:ext uri="{FF2B5EF4-FFF2-40B4-BE49-F238E27FC236}">
-                <a16:creationId xmlns:a16="http://schemas.microsoft.com/office/drawing/2014/main" id="{9A320181-E292-4A81-A246-392F2408E34D}"/>
-              </a:ext>
-            </a:extLst>
-          </p:cNvPr>
-          <p:cNvPicPr>
-            <a:picLocks noChangeAspect="1"/>
-          </p:cNvPicPr>
+          <p:cNvPr id="119" name="Picture 2" descr="https://o.remove.bg/downloads/bff62d5f-6c43-41d4-af4e-2156a2b4c341/image-removebg-preview.png"/>
+          <p:cNvPicPr/>
           <p:nvPr/>
         </p:nvPicPr>
         <p:blipFill>
-          <a:blip r:embed="rId2">
-            <a:extLst>
-              <a:ext uri="{28A0092B-C50C-407E-A947-70E740481C1C}">
-                <a14:useLocalDpi xmlns:a14="http://schemas.microsoft.com/office/drawing/2010/main" val="0"/>
-              </a:ext>
-            </a:extLst>
-          </a:blip>
-          <a:stretch>
-            <a:fillRect/>
-          </a:stretch>
+          <a:blip r:embed="rId2"/>
+          <a:stretch/>
         </p:blipFill>
         <p:spPr>
           <a:xfrm>
-            <a:off x="237974" y="483369"/>
-            <a:ext cx="6739602" cy="3560232"/>
-          </a:xfrm>
-          <a:prstGeom prst="rect">
-            <a:avLst/>
-          </a:prstGeom>
+            <a:off x="5520600" y="1933920"/>
+            <a:ext cx="1886760" cy="817920"/>
+          </a:xfrm>
+          <a:prstGeom prst="rect">
+            <a:avLst/>
+          </a:prstGeom>
+          <a:ln>
+            <a:noFill/>
+          </a:ln>
         </p:spPr>
       </p:pic>
       <p:pic>
         <p:nvPicPr>
-          <p:cNvPr id="5" name="Imagem 4">
-            <a:extLst>
-              <a:ext uri="{FF2B5EF4-FFF2-40B4-BE49-F238E27FC236}">
-                <a16:creationId xmlns:a16="http://schemas.microsoft.com/office/drawing/2014/main" id="{04D4BDE5-E4E9-4E86-B1AB-FB13F6D3A21C}"/>
-              </a:ext>
-            </a:extLst>
-          </p:cNvPr>
-          <p:cNvPicPr>
-            <a:picLocks noChangeAspect="1"/>
-          </p:cNvPicPr>
+          <p:cNvPr id="120" name="Picture 4" descr="Amazon Web Services – Wikipédia, a enciclopédia livre"/>
+          <p:cNvPicPr/>
           <p:nvPr/>
         </p:nvPicPr>
         <p:blipFill>
-          <a:blip r:embed="rId3">
-            <a:extLst>
-              <a:ext uri="{28A0092B-C50C-407E-A947-70E740481C1C}">
-                <a14:useLocalDpi xmlns:a14="http://schemas.microsoft.com/office/drawing/2010/main" val="0"/>
-              </a:ext>
-            </a:extLst>
-          </a:blip>
-          <a:stretch>
-            <a:fillRect/>
-          </a:stretch>
+          <a:blip r:embed="rId3"/>
+          <a:stretch/>
         </p:blipFill>
         <p:spPr>
           <a:xfrm>
-            <a:off x="6330244" y="2989520"/>
-            <a:ext cx="5261461" cy="3385111"/>
-          </a:xfrm>
-          <a:prstGeom prst="rect">
-            <a:avLst/>
-          </a:prstGeom>
+            <a:off x="7672680" y="2768040"/>
+            <a:ext cx="2208600" cy="1321200"/>
+          </a:xfrm>
+          <a:prstGeom prst="rect">
+            <a:avLst/>
+          </a:prstGeom>
+          <a:ln>
+            <a:noFill/>
+          </a:ln>
+        </p:spPr>
+      </p:pic>
+      <p:pic>
+        <p:nvPicPr>
+          <p:cNvPr id="121" name="Picture 6" descr="Microsoft Azure - Wikipedia"/>
+          <p:cNvPicPr/>
+          <p:nvPr/>
+        </p:nvPicPr>
+        <p:blipFill>
+          <a:blip r:embed="rId4"/>
+          <a:stretch/>
+        </p:blipFill>
+        <p:spPr>
+          <a:xfrm>
+            <a:off x="2306880" y="1887840"/>
+            <a:ext cx="2093040" cy="2093040"/>
+          </a:xfrm>
+          <a:prstGeom prst="rect">
+            <a:avLst/>
+          </a:prstGeom>
+          <a:ln>
+            <a:noFill/>
+          </a:ln>
+        </p:spPr>
+      </p:pic>
+      <p:pic>
+        <p:nvPicPr>
+          <p:cNvPr id="122" name="Picture 8" descr="Logotipo do github - ícones de mídia social grátis"/>
+          <p:cNvPicPr/>
+          <p:nvPr/>
+        </p:nvPicPr>
+        <p:blipFill>
+          <a:blip r:embed="rId5"/>
+          <a:stretch/>
+        </p:blipFill>
+        <p:spPr>
+          <a:xfrm>
+            <a:off x="4950000" y="3769560"/>
+            <a:ext cx="1258560" cy="1258560"/>
+          </a:xfrm>
+          <a:prstGeom prst="rect">
+            <a:avLst/>
+          </a:prstGeom>
+          <a:ln>
+            <a:noFill/>
+          </a:ln>
         </p:spPr>
       </p:pic>
     </p:spTree>
@@ -2374,42 +2566,73 @@
       </p:grpSpPr>
       <p:sp>
         <p:nvSpPr>
-          <p:cNvPr id="115" name="CustomShape 1"/>
+          <p:cNvPr id="106" name="CustomShape 1"/>
           <p:cNvSpPr/>
           <p:nvPr/>
         </p:nvSpPr>
         <p:spPr>
           <a:xfrm>
-            <a:off x="6847920" y="1636560"/>
-            <a:ext cx="3837240" cy="3837240"/>
-          </a:xfrm>
-          <a:prstGeom prst="ellipse">
-            <a:avLst/>
-          </a:prstGeom>
-          <a:solidFill>
-            <a:srgbClr val="2F50A1">
-              <a:alpha val="83000"/>
-            </a:srgbClr>
-          </a:solidFill>
-          <a:ln w="76320">
-            <a:noFill/>
-          </a:ln>
-          <a:effectLst>
-            <a:outerShdw blurRad="40000" dist="23040" dir="5400000" rotWithShape="0">
-              <a:srgbClr val="000000">
-                <a:alpha val="35000"/>
-              </a:srgbClr>
-            </a:outerShdw>
-          </a:effectLst>
+            <a:off x="4263480" y="1133640"/>
+            <a:ext cx="3458160" cy="6047640"/>
+          </a:xfrm>
+          <a:custGeom>
+            <a:avLst/>
+            <a:gdLst/>
+            <a:ahLst/>
+            <a:cxnLst/>
+            <a:rect l="l" t="t" r="r" b="b"/>
+            <a:pathLst>
+              <a:path w="5447" h="9525">
+                <a:moveTo>
+                  <a:pt x="0" y="0"/>
+                </a:moveTo>
+                <a:lnTo>
+                  <a:pt x="5447" y="0"/>
+                </a:lnTo>
+                <a:lnTo>
+                  <a:pt x="5447" y="9499"/>
+                </a:lnTo>
+                <a:lnTo>
+                  <a:pt x="3017" y="9499"/>
+                </a:lnTo>
+                <a:lnTo>
+                  <a:pt x="63" y="9525"/>
+                </a:lnTo>
+                <a:lnTo>
+                  <a:pt x="0" y="4622"/>
+                </a:lnTo>
+                <a:lnTo>
+                  <a:pt x="0" y="0"/>
+                </a:lnTo>
+                <a:close/>
+              </a:path>
+            </a:pathLst>
+          </a:custGeom>
+          <a:gradFill rotWithShape="0">
+            <a:gsLst>
+              <a:gs pos="47000">
+                <a:srgbClr val="FFFFFF"/>
+              </a:gs>
+              <a:gs pos="100000">
+                <a:srgbClr val="0765F4"/>
+              </a:gs>
+            </a:gsLst>
+            <a:lin ang="16200000"/>
+          </a:gradFill>
+          <a:ln>
+            <a:noFill/>
+          </a:ln>
         </p:spPr>
         <p:style>
-          <a:lnRef idx="1">
-            <a:schemeClr val="accent1"/>
+          <a:lnRef idx="2">
+            <a:schemeClr val="accent1">
+              <a:shade val="50000"/>
+            </a:schemeClr>
           </a:lnRef>
-          <a:fillRef idx="3">
+          <a:fillRef idx="1">
             <a:schemeClr val="accent1"/>
           </a:fillRef>
-          <a:effectRef idx="2">
+          <a:effectRef idx="0">
             <a:schemeClr val="accent1"/>
           </a:effectRef>
           <a:fontRef idx="minor"/>
@@ -2417,40 +2640,93 @@
       </p:sp>
       <p:sp>
         <p:nvSpPr>
-          <p:cNvPr id="116" name="CustomShape 2"/>
+          <p:cNvPr id="107" name="CustomShape 2"/>
           <p:cNvSpPr/>
           <p:nvPr/>
         </p:nvSpPr>
         <p:spPr>
           <a:xfrm>
-            <a:off x="1877760" y="1566000"/>
-            <a:ext cx="3060720" cy="3060720"/>
-          </a:xfrm>
-          <a:prstGeom prst="ellipse">
+            <a:off x="3930120" y="2060280"/>
+            <a:ext cx="4124520" cy="1735920"/>
+          </a:xfrm>
+          <a:prstGeom prst="rect">
+            <a:avLst/>
+          </a:prstGeom>
+          <a:noFill/>
+          <a:ln>
+            <a:noFill/>
+          </a:ln>
+        </p:spPr>
+        <p:style>
+          <a:lnRef idx="0">
+            <a:scrgbClr r="0" g="0" b="0"/>
+          </a:lnRef>
+          <a:fillRef idx="0">
+            <a:scrgbClr r="0" g="0" b="0"/>
+          </a:fillRef>
+          <a:effectRef idx="0">
+            <a:scrgbClr r="0" g="0" b="0"/>
+          </a:effectRef>
+          <a:fontRef idx="minor"/>
+        </p:style>
+        <p:txBody>
+          <a:bodyPr lIns="90000" tIns="45000" rIns="90000" bIns="45000">
+            <a:spAutoFit/>
+          </a:bodyPr>
+          <a:lstStyle/>
+          <a:p>
+            <a:pPr algn="ctr">
+              <a:lnSpc>
+                <a:spcPct val="100000"/>
+              </a:lnSpc>
+            </a:pPr>
+            <a:r>
+              <a:rPr lang="pt-BR" sz="5400" b="0" strike="noStrike" spc="-1">
+                <a:solidFill>
+                  <a:srgbClr val="125490"/>
+                </a:solidFill>
+                <a:latin typeface="思源黑体 CN Medium"/>
+                <a:ea typeface="思源黑体 CN Medium"/>
+              </a:rPr>
+              <a:t>Product Backlog</a:t>
+            </a:r>
+            <a:endParaRPr lang="pt-BR" sz="5400" b="0" strike="noStrike" spc="-1">
+              <a:latin typeface="Arial"/>
+            </a:endParaRPr>
+          </a:p>
+        </p:txBody>
+      </p:sp>
+      <p:sp>
+        <p:nvSpPr>
+          <p:cNvPr id="108" name="CustomShape 3"/>
+          <p:cNvSpPr/>
+          <p:nvPr/>
+        </p:nvSpPr>
+        <p:spPr>
+          <a:xfrm>
+            <a:off x="0" y="0"/>
+            <a:ext cx="12191400" cy="361800"/>
+          </a:xfrm>
+          <a:prstGeom prst="rect">
             <a:avLst/>
           </a:prstGeom>
           <a:solidFill>
-            <a:srgbClr val="D9D9D9"/>
+            <a:srgbClr val="0D31B7"/>
           </a:solidFill>
-          <a:ln w="76320">
-            <a:noFill/>
-          </a:ln>
-          <a:effectLst>
-            <a:outerShdw blurRad="40000" dist="23040" dir="5400000" rotWithShape="0">
-              <a:srgbClr val="000000">
-                <a:alpha val="35000"/>
-              </a:srgbClr>
-            </a:outerShdw>
-          </a:effectLst>
+          <a:ln>
+            <a:noFill/>
+          </a:ln>
         </p:spPr>
         <p:style>
-          <a:lnRef idx="1">
-            <a:schemeClr val="accent1"/>
+          <a:lnRef idx="2">
+            <a:schemeClr val="accent1">
+              <a:shade val="50000"/>
+            </a:schemeClr>
           </a:lnRef>
-          <a:fillRef idx="3">
+          <a:fillRef idx="1">
             <a:schemeClr val="accent1"/>
           </a:fillRef>
-          <a:effectRef idx="2">
+          <a:effectRef idx="0">
             <a:schemeClr val="accent1"/>
           </a:effectRef>
           <a:fontRef idx="minor"/>
@@ -2458,40 +2734,35 @@
       </p:sp>
       <p:sp>
         <p:nvSpPr>
-          <p:cNvPr id="117" name="CustomShape 3"/>
+          <p:cNvPr id="109" name="CustomShape 4"/>
           <p:cNvSpPr/>
           <p:nvPr/>
         </p:nvSpPr>
         <p:spPr>
           <a:xfrm>
-            <a:off x="4337640" y="3255480"/>
-            <a:ext cx="2483280" cy="2483280"/>
-          </a:xfrm>
-          <a:prstGeom prst="ellipse">
+            <a:off x="0" y="6495480"/>
+            <a:ext cx="12191400" cy="361800"/>
+          </a:xfrm>
+          <a:prstGeom prst="rect">
             <a:avLst/>
           </a:prstGeom>
           <a:solidFill>
-            <a:srgbClr val="2F50A1"/>
+            <a:srgbClr val="0D31B7"/>
           </a:solidFill>
-          <a:ln w="76320">
-            <a:noFill/>
-          </a:ln>
-          <a:effectLst>
-            <a:outerShdw blurRad="40000" dist="23040" dir="5400000" rotWithShape="0">
-              <a:srgbClr val="000000">
-                <a:alpha val="35000"/>
-              </a:srgbClr>
-            </a:outerShdw>
-          </a:effectLst>
+          <a:ln>
+            <a:noFill/>
+          </a:ln>
         </p:spPr>
         <p:style>
-          <a:lnRef idx="1">
-            <a:schemeClr val="accent1"/>
+          <a:lnRef idx="2">
+            <a:schemeClr val="accent1">
+              <a:shade val="50000"/>
+            </a:schemeClr>
           </a:lnRef>
-          <a:fillRef idx="3">
+          <a:fillRef idx="1">
             <a:schemeClr val="accent1"/>
           </a:fillRef>
-          <a:effectRef idx="2">
+          <a:effectRef idx="0">
             <a:schemeClr val="accent1"/>
           </a:effectRef>
           <a:fontRef idx="minor"/>
@@ -2499,48 +2770,79 @@
       </p:sp>
       <p:sp>
         <p:nvSpPr>
-          <p:cNvPr id="118" name="CustomShape 4"/>
+          <p:cNvPr id="110" name="CustomShape 5"/>
           <p:cNvSpPr/>
           <p:nvPr/>
         </p:nvSpPr>
         <p:spPr>
-          <a:xfrm>
-            <a:off x="5350680" y="1434960"/>
-            <a:ext cx="2030760" cy="2030760"/>
-          </a:xfrm>
-          <a:prstGeom prst="ellipse">
+          <a:xfrm rot="5400000">
+            <a:off x="8585280" y="3246840"/>
+            <a:ext cx="6857280" cy="361800"/>
+          </a:xfrm>
+          <a:prstGeom prst="rect">
             <a:avLst/>
           </a:prstGeom>
           <a:solidFill>
-            <a:srgbClr val="2F50A1"/>
+            <a:srgbClr val="0D31B7"/>
           </a:solidFill>
-          <a:ln w="76320">
-            <a:noFill/>
-          </a:ln>
-          <a:effectLst>
-            <a:outerShdw blurRad="40000" dist="23040" dir="5400000" rotWithShape="0">
-              <a:srgbClr val="000000">
-                <a:alpha val="35000"/>
-              </a:srgbClr>
-            </a:outerShdw>
-          </a:effectLst>
+          <a:ln>
+            <a:noFill/>
+          </a:ln>
         </p:spPr>
         <p:style>
-          <a:lnRef idx="1">
-            <a:schemeClr val="accent1"/>
+          <a:lnRef idx="2">
+            <a:schemeClr val="accent1">
+              <a:shade val="50000"/>
+            </a:schemeClr>
           </a:lnRef>
-          <a:fillRef idx="3">
+          <a:fillRef idx="1">
             <a:schemeClr val="accent1"/>
           </a:fillRef>
-          <a:effectRef idx="2">
+          <a:effectRef idx="0">
             <a:schemeClr val="accent1"/>
           </a:effectRef>
           <a:fontRef idx="minor"/>
         </p:style>
       </p:sp>
+      <p:sp>
+        <p:nvSpPr>
+          <p:cNvPr id="111" name="CustomShape 6"/>
+          <p:cNvSpPr/>
+          <p:nvPr/>
+        </p:nvSpPr>
+        <p:spPr>
+          <a:xfrm rot="5400000">
+            <a:off x="-3246120" y="3246840"/>
+            <a:ext cx="6857280" cy="361800"/>
+          </a:xfrm>
+          <a:prstGeom prst="rect">
+            <a:avLst/>
+          </a:prstGeom>
+          <a:solidFill>
+            <a:srgbClr val="0D31B7"/>
+          </a:solidFill>
+          <a:ln>
+            <a:noFill/>
+          </a:ln>
+        </p:spPr>
+        <p:style>
+          <a:lnRef idx="2">
+            <a:schemeClr val="accent1">
+              <a:shade val="50000"/>
+            </a:schemeClr>
+          </a:lnRef>
+          <a:fillRef idx="1">
+            <a:schemeClr val="accent1"/>
+          </a:fillRef>
+          <a:effectRef idx="0">
+            <a:schemeClr val="accent1"/>
+          </a:effectRef>
+          <a:fontRef idx="minor"/>
+        </p:style>
+      </p:sp>
       <p:pic>
         <p:nvPicPr>
-          <p:cNvPr id="119" name="Picture 2" descr="https://o.remove.bg/downloads/bff62d5f-6c43-41d4-af4e-2156a2b4c341/image-removebg-preview.png"/>
+          <p:cNvPr id="112" name="Picture 2" descr="Microsoft 365 Education – oit.ua.edu | The University of Alabama"/>
           <p:cNvPicPr/>
           <p:nvPr/>
         </p:nvPicPr>
@@ -2550,77 +2852,8 @@
         </p:blipFill>
         <p:spPr>
           <a:xfrm>
-            <a:off x="5520600" y="1933920"/>
-            <a:ext cx="1886760" cy="817920"/>
-          </a:xfrm>
-          <a:prstGeom prst="rect">
-            <a:avLst/>
-          </a:prstGeom>
-          <a:ln>
-            <a:noFill/>
-          </a:ln>
-        </p:spPr>
-      </p:pic>
-      <p:pic>
-        <p:nvPicPr>
-          <p:cNvPr id="120" name="Picture 4" descr="Amazon Web Services – Wikipédia, a enciclopédia livre"/>
-          <p:cNvPicPr/>
-          <p:nvPr/>
-        </p:nvPicPr>
-        <p:blipFill>
-          <a:blip r:embed="rId3"/>
-          <a:stretch/>
-        </p:blipFill>
-        <p:spPr>
-          <a:xfrm>
-            <a:off x="7672680" y="2768040"/>
-            <a:ext cx="2208600" cy="1321200"/>
-          </a:xfrm>
-          <a:prstGeom prst="rect">
-            <a:avLst/>
-          </a:prstGeom>
-          <a:ln>
-            <a:noFill/>
-          </a:ln>
-        </p:spPr>
-      </p:pic>
-      <p:pic>
-        <p:nvPicPr>
-          <p:cNvPr id="121" name="Picture 6" descr="Microsoft Azure - Wikipedia"/>
-          <p:cNvPicPr/>
-          <p:nvPr/>
-        </p:nvPicPr>
-        <p:blipFill>
-          <a:blip r:embed="rId4"/>
-          <a:stretch/>
-        </p:blipFill>
-        <p:spPr>
-          <a:xfrm>
-            <a:off x="2306880" y="1887840"/>
-            <a:ext cx="2093040" cy="2093040"/>
-          </a:xfrm>
-          <a:prstGeom prst="rect">
-            <a:avLst/>
-          </a:prstGeom>
-          <a:ln>
-            <a:noFill/>
-          </a:ln>
-        </p:spPr>
-      </p:pic>
-      <p:pic>
-        <p:nvPicPr>
-          <p:cNvPr id="122" name="Picture 8" descr="Logotipo do github - ícones de mídia social grátis"/>
-          <p:cNvPicPr/>
-          <p:nvPr/>
-        </p:nvPicPr>
-        <p:blipFill>
-          <a:blip r:embed="rId5"/>
-          <a:stretch/>
-        </p:blipFill>
-        <p:spPr>
-          <a:xfrm>
-            <a:off x="4950000" y="3769560"/>
-            <a:ext cx="1258560" cy="1258560"/>
+            <a:off x="5486400" y="4585320"/>
+            <a:ext cx="1218600" cy="1218600"/>
           </a:xfrm>
           <a:prstGeom prst="rect">
             <a:avLst/>
@@ -2639,6 +2872,94 @@
 </file>
 
 <file path=ppt/slides/slide12.xml><?xml version="1.0" encoding="utf-8"?>
+<p:sld xmlns:a="http://schemas.openxmlformats.org/drawingml/2006/main" xmlns:r="http://schemas.openxmlformats.org/officeDocument/2006/relationships" xmlns:p="http://schemas.openxmlformats.org/presentationml/2006/main">
+  <p:cSld>
+    <p:spTree>
+      <p:nvGrpSpPr>
+        <p:cNvPr id="1" name=""/>
+        <p:cNvGrpSpPr/>
+        <p:nvPr/>
+      </p:nvGrpSpPr>
+      <p:grpSpPr>
+        <a:xfrm>
+          <a:off x="0" y="0"/>
+          <a:ext cx="0" cy="0"/>
+          <a:chOff x="0" y="0"/>
+          <a:chExt cx="0" cy="0"/>
+        </a:xfrm>
+      </p:grpSpPr>
+      <p:sp>
+        <p:nvSpPr>
+          <p:cNvPr id="2" name="Título 1">
+            <a:extLst>
+              <a:ext uri="{FF2B5EF4-FFF2-40B4-BE49-F238E27FC236}">
+                <a16:creationId xmlns:a16="http://schemas.microsoft.com/office/drawing/2014/main" id="{3019AB62-53F9-425E-AA6C-2E1ED84EA1FE}"/>
+              </a:ext>
+            </a:extLst>
+          </p:cNvPr>
+          <p:cNvSpPr>
+            <a:spLocks noGrp="1"/>
+          </p:cNvSpPr>
+          <p:nvPr>
+            <p:ph type="title"/>
+          </p:nvPr>
+        </p:nvSpPr>
+        <p:spPr/>
+        <p:txBody>
+          <a:bodyPr/>
+          <a:lstStyle/>
+          <a:p>
+            <a:r>
+              <a:rPr lang="pt-BR" dirty="0"/>
+              <a:t>Metodologia</a:t>
+            </a:r>
+          </a:p>
+        </p:txBody>
+      </p:sp>
+      <p:pic>
+        <p:nvPicPr>
+          <p:cNvPr id="4" name="Imagem 3">
+            <a:extLst>
+              <a:ext uri="{FF2B5EF4-FFF2-40B4-BE49-F238E27FC236}">
+                <a16:creationId xmlns:a16="http://schemas.microsoft.com/office/drawing/2014/main" id="{80AF56C2-3D03-422A-9B91-CABEEFF22B0E}"/>
+              </a:ext>
+            </a:extLst>
+          </p:cNvPr>
+          <p:cNvPicPr>
+            <a:picLocks noChangeAspect="1"/>
+          </p:cNvPicPr>
+          <p:nvPr/>
+        </p:nvPicPr>
+        <p:blipFill>
+          <a:blip r:embed="rId2"/>
+          <a:stretch>
+            <a:fillRect/>
+          </a:stretch>
+        </p:blipFill>
+        <p:spPr>
+          <a:xfrm>
+            <a:off x="669243" y="1418400"/>
+            <a:ext cx="10676074" cy="3955458"/>
+          </a:xfrm>
+          <a:prstGeom prst="rect">
+            <a:avLst/>
+          </a:prstGeom>
+        </p:spPr>
+      </p:pic>
+    </p:spTree>
+    <p:extLst>
+      <p:ext uri="{BB962C8B-B14F-4D97-AF65-F5344CB8AC3E}">
+        <p14:creationId xmlns:p14="http://schemas.microsoft.com/office/powerpoint/2010/main" val="790331023"/>
+      </p:ext>
+    </p:extLst>
+  </p:cSld>
+  <p:clrMapOvr>
+    <a:masterClrMapping/>
+  </p:clrMapOvr>
+</p:sld>
+</file>
+
+<file path=ppt/slides/slide13.xml><?xml version="1.0" encoding="utf-8"?>
 <p:sld xmlns:a="http://schemas.openxmlformats.org/drawingml/2006/main" xmlns:r="http://schemas.openxmlformats.org/officeDocument/2006/relationships" xmlns:p="http://schemas.openxmlformats.org/presentationml/2006/main">
   <p:cSld>
     <p:spTree>
@@ -2698,7 +3019,7 @@
 </p:sld>
 </file>
 
-<file path=ppt/slides/slide13.xml><?xml version="1.0" encoding="utf-8"?>
+<file path=ppt/slides/slide14.xml><?xml version="1.0" encoding="utf-8"?>
 <p:sld xmlns:a="http://schemas.openxmlformats.org/drawingml/2006/main" xmlns:r="http://schemas.openxmlformats.org/officeDocument/2006/relationships" xmlns:p="http://schemas.openxmlformats.org/presentationml/2006/main">
   <p:cSld>
     <p:bg>
@@ -2975,7 +3296,7 @@
 </p:sld>
 </file>
 
-<file path=ppt/slides/slide14.xml><?xml version="1.0" encoding="utf-8"?>
+<file path=ppt/slides/slide15.xml><?xml version="1.0" encoding="utf-8"?>
 <p:sld xmlns:a="http://schemas.openxmlformats.org/drawingml/2006/main" xmlns:r="http://schemas.openxmlformats.org/officeDocument/2006/relationships" xmlns:p="http://schemas.openxmlformats.org/presentationml/2006/main">
   <p:cSld>
     <p:bg>
@@ -3957,7 +4278,7 @@
         </p:nvSpPr>
         <p:spPr>
           <a:xfrm>
-            <a:off x="1944000" y="3620146"/>
+            <a:off x="5288622" y="2877072"/>
             <a:ext cx="2108880" cy="274320"/>
           </a:xfrm>
           <a:prstGeom prst="rect">
@@ -4176,7 +4497,7 @@
         </p:nvSpPr>
         <p:spPr>
           <a:xfrm>
-            <a:off x="5288622" y="2854886"/>
+            <a:off x="5288622" y="2081978"/>
             <a:ext cx="2725920" cy="276999"/>
           </a:xfrm>
           <a:prstGeom prst="rect">
@@ -4234,7 +4555,7 @@
         </p:nvSpPr>
         <p:spPr>
           <a:xfrm>
-            <a:off x="5288622" y="4377766"/>
+            <a:off x="5288622" y="5161943"/>
             <a:ext cx="2108880" cy="274320"/>
           </a:xfrm>
           <a:prstGeom prst="rect">
@@ -4292,7 +4613,7 @@
         </p:nvSpPr>
         <p:spPr>
           <a:xfrm>
-            <a:off x="5288622" y="5155570"/>
+            <a:off x="8991536" y="2070792"/>
             <a:ext cx="2108880" cy="274320"/>
           </a:xfrm>
           <a:prstGeom prst="rect">
@@ -4350,7 +4671,7 @@
         </p:nvSpPr>
         <p:spPr>
           <a:xfrm>
-            <a:off x="1944000" y="4386960"/>
+            <a:off x="1944000" y="3626654"/>
             <a:ext cx="2108880" cy="274320"/>
           </a:xfrm>
           <a:prstGeom prst="rect">
@@ -4408,7 +4729,7 @@
         </p:nvSpPr>
         <p:spPr>
           <a:xfrm>
-            <a:off x="1944000" y="5147266"/>
+            <a:off x="1944000" y="4419051"/>
             <a:ext cx="2108880" cy="274320"/>
           </a:xfrm>
           <a:prstGeom prst="rect">
@@ -4466,7 +4787,7 @@
         </p:nvSpPr>
         <p:spPr>
           <a:xfrm>
-            <a:off x="5288622" y="2070792"/>
+            <a:off x="1944000" y="5144843"/>
             <a:ext cx="2108880" cy="274320"/>
           </a:xfrm>
           <a:prstGeom prst="rect">
@@ -4534,7 +4855,7 @@
         </p:nvSpPr>
         <p:spPr>
           <a:xfrm>
-            <a:off x="5288622" y="3599962"/>
+            <a:off x="5288622" y="4419051"/>
             <a:ext cx="2108880" cy="274320"/>
           </a:xfrm>
           <a:prstGeom prst="rect">
@@ -5539,6 +5860,185 @@
               <a:t>10</a:t>
             </a:r>
             <a:endParaRPr lang="pt-BR" sz="2400" b="0" strike="noStrike" spc="-1" dirty="0">
+              <a:latin typeface="Arial"/>
+            </a:endParaRPr>
+          </a:p>
+        </p:txBody>
+      </p:sp>
+      <p:sp>
+        <p:nvSpPr>
+          <p:cNvPr id="39" name="CustomShape 7">
+            <a:extLst>
+              <a:ext uri="{FF2B5EF4-FFF2-40B4-BE49-F238E27FC236}">
+                <a16:creationId xmlns:a16="http://schemas.microsoft.com/office/drawing/2014/main" id="{CAE1204B-DE38-45A6-9B35-893198CBEEBF}"/>
+              </a:ext>
+            </a:extLst>
+          </p:cNvPr>
+          <p:cNvSpPr/>
+          <p:nvPr/>
+        </p:nvSpPr>
+        <p:spPr>
+          <a:xfrm>
+            <a:off x="8292526" y="1941211"/>
+            <a:ext cx="555120" cy="567720"/>
+          </a:xfrm>
+          <a:prstGeom prst="rect">
+            <a:avLst/>
+          </a:prstGeom>
+          <a:solidFill>
+            <a:srgbClr val="2F50A1"/>
+          </a:solidFill>
+          <a:ln>
+            <a:noFill/>
+          </a:ln>
+        </p:spPr>
+        <p:style>
+          <a:lnRef idx="2">
+            <a:schemeClr val="accent1">
+              <a:shade val="50000"/>
+            </a:schemeClr>
+          </a:lnRef>
+          <a:fillRef idx="1">
+            <a:schemeClr val="accent1"/>
+          </a:fillRef>
+          <a:effectRef idx="0">
+            <a:schemeClr val="accent1"/>
+          </a:effectRef>
+          <a:fontRef idx="minor"/>
+        </p:style>
+      </p:sp>
+      <p:sp>
+        <p:nvSpPr>
+          <p:cNvPr id="40" name="CustomShape 13">
+            <a:extLst>
+              <a:ext uri="{FF2B5EF4-FFF2-40B4-BE49-F238E27FC236}">
+                <a16:creationId xmlns:a16="http://schemas.microsoft.com/office/drawing/2014/main" id="{2CCA72DD-A929-4A36-84DF-CDD6696FA696}"/>
+              </a:ext>
+            </a:extLst>
+          </p:cNvPr>
+          <p:cNvSpPr/>
+          <p:nvPr/>
+        </p:nvSpPr>
+        <p:spPr>
+          <a:xfrm>
+            <a:off x="8304351" y="2000080"/>
+            <a:ext cx="555120" cy="460211"/>
+          </a:xfrm>
+          <a:prstGeom prst="rect">
+            <a:avLst/>
+          </a:prstGeom>
+          <a:noFill/>
+          <a:ln>
+            <a:noFill/>
+          </a:ln>
+        </p:spPr>
+        <p:style>
+          <a:lnRef idx="0">
+            <a:scrgbClr r="0" g="0" b="0"/>
+          </a:lnRef>
+          <a:fillRef idx="0">
+            <a:scrgbClr r="0" g="0" b="0"/>
+          </a:fillRef>
+          <a:effectRef idx="0">
+            <a:scrgbClr r="0" g="0" b="0"/>
+          </a:effectRef>
+          <a:fontRef idx="minor"/>
+        </p:style>
+        <p:txBody>
+          <a:bodyPr lIns="90000" tIns="45000" rIns="90000" bIns="45000">
+            <a:spAutoFit/>
+          </a:bodyPr>
+          <a:lstStyle/>
+          <a:p>
+            <a:pPr>
+              <a:lnSpc>
+                <a:spcPct val="100000"/>
+              </a:lnSpc>
+            </a:pPr>
+            <a:r>
+              <a:rPr lang="en-US" sz="2400" cap="all" spc="-1" dirty="0">
+                <a:solidFill>
+                  <a:srgbClr val="FFFFFF"/>
+                </a:solidFill>
+                <a:latin typeface="思源黑体 CN Medium"/>
+              </a:rPr>
+              <a:t>11</a:t>
+            </a:r>
+            <a:endParaRPr lang="pt-BR" sz="2400" b="0" strike="noStrike" spc="-1" dirty="0">
+              <a:latin typeface="Arial"/>
+            </a:endParaRPr>
+          </a:p>
+        </p:txBody>
+      </p:sp>
+      <p:sp>
+        <p:nvSpPr>
+          <p:cNvPr id="48" name="CustomShape 24">
+            <a:extLst>
+              <a:ext uri="{FF2B5EF4-FFF2-40B4-BE49-F238E27FC236}">
+                <a16:creationId xmlns:a16="http://schemas.microsoft.com/office/drawing/2014/main" id="{3B2B4532-5070-4163-AA7D-5FD399FD3A05}"/>
+              </a:ext>
+            </a:extLst>
+          </p:cNvPr>
+          <p:cNvSpPr/>
+          <p:nvPr/>
+        </p:nvSpPr>
+        <p:spPr>
+          <a:xfrm>
+            <a:off x="5288622" y="3626654"/>
+            <a:ext cx="2108880" cy="274320"/>
+          </a:xfrm>
+          <a:prstGeom prst="rect">
+            <a:avLst/>
+          </a:prstGeom>
+          <a:noFill/>
+          <a:ln>
+            <a:noFill/>
+          </a:ln>
+        </p:spPr>
+        <p:style>
+          <a:lnRef idx="0">
+            <a:scrgbClr r="0" g="0" b="0"/>
+          </a:lnRef>
+          <a:fillRef idx="0">
+            <a:scrgbClr r="0" g="0" b="0"/>
+          </a:fillRef>
+          <a:effectRef idx="0">
+            <a:scrgbClr r="0" g="0" b="0"/>
+          </a:effectRef>
+          <a:fontRef idx="minor"/>
+        </p:style>
+        <p:txBody>
+          <a:bodyPr lIns="0" tIns="0" rIns="0" bIns="0">
+            <a:spAutoFit/>
+          </a:bodyPr>
+          <a:lstStyle/>
+          <a:p>
+            <a:pPr>
+              <a:lnSpc>
+                <a:spcPct val="100000"/>
+              </a:lnSpc>
+            </a:pPr>
+            <a:r>
+              <a:rPr lang="pt-BR" spc="-1" dirty="0">
+                <a:solidFill>
+                  <a:srgbClr val="595959"/>
+                </a:solidFill>
+                <a:latin typeface="思源黑体 CN Bold"/>
+                <a:ea typeface="思源黑体 CN Bold"/>
+              </a:rPr>
+              <a:t>Metodologia</a:t>
+            </a:r>
+            <a:r>
+              <a:rPr lang="pt-BR" sz="1800" b="0" strike="noStrike" spc="-1" dirty="0">
+                <a:solidFill>
+                  <a:srgbClr val="595959"/>
+                </a:solidFill>
+                <a:latin typeface="思源黑体 CN Bold"/>
+                <a:ea typeface="思源黑体 CN Bold"/>
+              </a:rPr>
+              <a:t> </a:t>
+            </a:r>
+            <a:endParaRPr lang="pt-BR" sz="1800" b="0" strike="noStrike" spc="-1" dirty="0">
               <a:latin typeface="Arial"/>
             </a:endParaRPr>
           </a:p>
@@ -7227,14 +7727,6 @@
 <file path=ppt/slides/slide6.xml><?xml version="1.0" encoding="utf-8"?>
 <p:sld xmlns:a="http://schemas.openxmlformats.org/drawingml/2006/main" xmlns:r="http://schemas.openxmlformats.org/officeDocument/2006/relationships" xmlns:p="http://schemas.openxmlformats.org/presentationml/2006/main">
   <p:cSld>
-    <p:bg>
-      <p:bgPr>
-        <a:solidFill>
-          <a:srgbClr val="FFFFFF"/>
-        </a:solidFill>
-        <a:effectLst/>
-      </p:bgPr>
-    </p:bg>
     <p:spTree>
       <p:nvGrpSpPr>
         <p:cNvPr id="1" name=""/>
@@ -7249,285 +7741,9 @@
           <a:chExt cx="0" cy="0"/>
         </a:xfrm>
       </p:grpSpPr>
-      <p:sp>
-        <p:nvSpPr>
-          <p:cNvPr id="106" name="CustomShape 1"/>
-          <p:cNvSpPr/>
-          <p:nvPr/>
-        </p:nvSpPr>
-        <p:spPr>
-          <a:xfrm>
-            <a:off x="4263480" y="1133640"/>
-            <a:ext cx="3458160" cy="6047640"/>
-          </a:xfrm>
-          <a:custGeom>
-            <a:avLst/>
-            <a:gdLst/>
-            <a:ahLst/>
-            <a:cxnLst/>
-            <a:rect l="l" t="t" r="r" b="b"/>
-            <a:pathLst>
-              <a:path w="5447" h="9525">
-                <a:moveTo>
-                  <a:pt x="0" y="0"/>
-                </a:moveTo>
-                <a:lnTo>
-                  <a:pt x="5447" y="0"/>
-                </a:lnTo>
-                <a:lnTo>
-                  <a:pt x="5447" y="9499"/>
-                </a:lnTo>
-                <a:lnTo>
-                  <a:pt x="3017" y="9499"/>
-                </a:lnTo>
-                <a:lnTo>
-                  <a:pt x="63" y="9525"/>
-                </a:lnTo>
-                <a:lnTo>
-                  <a:pt x="0" y="4622"/>
-                </a:lnTo>
-                <a:lnTo>
-                  <a:pt x="0" y="0"/>
-                </a:lnTo>
-                <a:close/>
-              </a:path>
-            </a:pathLst>
-          </a:custGeom>
-          <a:gradFill rotWithShape="0">
-            <a:gsLst>
-              <a:gs pos="47000">
-                <a:srgbClr val="FFFFFF"/>
-              </a:gs>
-              <a:gs pos="100000">
-                <a:srgbClr val="0765F4"/>
-              </a:gs>
-            </a:gsLst>
-            <a:lin ang="16200000"/>
-          </a:gradFill>
-          <a:ln>
-            <a:noFill/>
-          </a:ln>
-        </p:spPr>
-        <p:style>
-          <a:lnRef idx="2">
-            <a:schemeClr val="accent1">
-              <a:shade val="50000"/>
-            </a:schemeClr>
-          </a:lnRef>
-          <a:fillRef idx="1">
-            <a:schemeClr val="accent1"/>
-          </a:fillRef>
-          <a:effectRef idx="0">
-            <a:schemeClr val="accent1"/>
-          </a:effectRef>
-          <a:fontRef idx="minor"/>
-        </p:style>
-      </p:sp>
-      <p:sp>
-        <p:nvSpPr>
-          <p:cNvPr id="107" name="CustomShape 2"/>
-          <p:cNvSpPr/>
-          <p:nvPr/>
-        </p:nvSpPr>
-        <p:spPr>
-          <a:xfrm>
-            <a:off x="3930120" y="2060280"/>
-            <a:ext cx="4124520" cy="1735920"/>
-          </a:xfrm>
-          <a:prstGeom prst="rect">
-            <a:avLst/>
-          </a:prstGeom>
-          <a:noFill/>
-          <a:ln>
-            <a:noFill/>
-          </a:ln>
-        </p:spPr>
-        <p:style>
-          <a:lnRef idx="0">
-            <a:scrgbClr r="0" g="0" b="0"/>
-          </a:lnRef>
-          <a:fillRef idx="0">
-            <a:scrgbClr r="0" g="0" b="0"/>
-          </a:fillRef>
-          <a:effectRef idx="0">
-            <a:scrgbClr r="0" g="0" b="0"/>
-          </a:effectRef>
-          <a:fontRef idx="minor"/>
-        </p:style>
-        <p:txBody>
-          <a:bodyPr lIns="90000" tIns="45000" rIns="90000" bIns="45000">
-            <a:spAutoFit/>
-          </a:bodyPr>
-          <a:lstStyle/>
-          <a:p>
-            <a:pPr algn="ctr">
-              <a:lnSpc>
-                <a:spcPct val="100000"/>
-              </a:lnSpc>
-            </a:pPr>
-            <a:r>
-              <a:rPr lang="pt-BR" sz="5400" b="0" strike="noStrike" spc="-1">
-                <a:solidFill>
-                  <a:srgbClr val="125490"/>
-                </a:solidFill>
-                <a:latin typeface="思源黑体 CN Medium"/>
-                <a:ea typeface="思源黑体 CN Medium"/>
-              </a:rPr>
-              <a:t>Product Backlog</a:t>
-            </a:r>
-            <a:endParaRPr lang="pt-BR" sz="5400" b="0" strike="noStrike" spc="-1">
-              <a:latin typeface="Arial"/>
-            </a:endParaRPr>
-          </a:p>
-        </p:txBody>
-      </p:sp>
-      <p:sp>
-        <p:nvSpPr>
-          <p:cNvPr id="108" name="CustomShape 3"/>
-          <p:cNvSpPr/>
-          <p:nvPr/>
-        </p:nvSpPr>
-        <p:spPr>
-          <a:xfrm>
-            <a:off x="0" y="0"/>
-            <a:ext cx="12191400" cy="361800"/>
-          </a:xfrm>
-          <a:prstGeom prst="rect">
-            <a:avLst/>
-          </a:prstGeom>
-          <a:solidFill>
-            <a:srgbClr val="0D31B7"/>
-          </a:solidFill>
-          <a:ln>
-            <a:noFill/>
-          </a:ln>
-        </p:spPr>
-        <p:style>
-          <a:lnRef idx="2">
-            <a:schemeClr val="accent1">
-              <a:shade val="50000"/>
-            </a:schemeClr>
-          </a:lnRef>
-          <a:fillRef idx="1">
-            <a:schemeClr val="accent1"/>
-          </a:fillRef>
-          <a:effectRef idx="0">
-            <a:schemeClr val="accent1"/>
-          </a:effectRef>
-          <a:fontRef idx="minor"/>
-        </p:style>
-      </p:sp>
-      <p:sp>
-        <p:nvSpPr>
-          <p:cNvPr id="109" name="CustomShape 4"/>
-          <p:cNvSpPr/>
-          <p:nvPr/>
-        </p:nvSpPr>
-        <p:spPr>
-          <a:xfrm>
-            <a:off x="0" y="6495480"/>
-            <a:ext cx="12191400" cy="361800"/>
-          </a:xfrm>
-          <a:prstGeom prst="rect">
-            <a:avLst/>
-          </a:prstGeom>
-          <a:solidFill>
-            <a:srgbClr val="0D31B7"/>
-          </a:solidFill>
-          <a:ln>
-            <a:noFill/>
-          </a:ln>
-        </p:spPr>
-        <p:style>
-          <a:lnRef idx="2">
-            <a:schemeClr val="accent1">
-              <a:shade val="50000"/>
-            </a:schemeClr>
-          </a:lnRef>
-          <a:fillRef idx="1">
-            <a:schemeClr val="accent1"/>
-          </a:fillRef>
-          <a:effectRef idx="0">
-            <a:schemeClr val="accent1"/>
-          </a:effectRef>
-          <a:fontRef idx="minor"/>
-        </p:style>
-      </p:sp>
-      <p:sp>
-        <p:nvSpPr>
-          <p:cNvPr id="110" name="CustomShape 5"/>
-          <p:cNvSpPr/>
-          <p:nvPr/>
-        </p:nvSpPr>
-        <p:spPr>
-          <a:xfrm rot="5400000">
-            <a:off x="8585280" y="3246840"/>
-            <a:ext cx="6857280" cy="361800"/>
-          </a:xfrm>
-          <a:prstGeom prst="rect">
-            <a:avLst/>
-          </a:prstGeom>
-          <a:solidFill>
-            <a:srgbClr val="0D31B7"/>
-          </a:solidFill>
-          <a:ln>
-            <a:noFill/>
-          </a:ln>
-        </p:spPr>
-        <p:style>
-          <a:lnRef idx="2">
-            <a:schemeClr val="accent1">
-              <a:shade val="50000"/>
-            </a:schemeClr>
-          </a:lnRef>
-          <a:fillRef idx="1">
-            <a:schemeClr val="accent1"/>
-          </a:fillRef>
-          <a:effectRef idx="0">
-            <a:schemeClr val="accent1"/>
-          </a:effectRef>
-          <a:fontRef idx="minor"/>
-        </p:style>
-      </p:sp>
-      <p:sp>
-        <p:nvSpPr>
-          <p:cNvPr id="111" name="CustomShape 6"/>
-          <p:cNvSpPr/>
-          <p:nvPr/>
-        </p:nvSpPr>
-        <p:spPr>
-          <a:xfrm rot="5400000">
-            <a:off x="-3246120" y="3246840"/>
-            <a:ext cx="6857280" cy="361800"/>
-          </a:xfrm>
-          <a:prstGeom prst="rect">
-            <a:avLst/>
-          </a:prstGeom>
-          <a:solidFill>
-            <a:srgbClr val="0D31B7"/>
-          </a:solidFill>
-          <a:ln>
-            <a:noFill/>
-          </a:ln>
-        </p:spPr>
-        <p:style>
-          <a:lnRef idx="2">
-            <a:schemeClr val="accent1">
-              <a:shade val="50000"/>
-            </a:schemeClr>
-          </a:lnRef>
-          <a:fillRef idx="1">
-            <a:schemeClr val="accent1"/>
-          </a:fillRef>
-          <a:effectRef idx="0">
-            <a:schemeClr val="accent1"/>
-          </a:effectRef>
-          <a:fontRef idx="minor"/>
-        </p:style>
-      </p:sp>
       <p:pic>
         <p:nvPicPr>
-          <p:cNvPr id="112" name="Picture 2" descr="Microsoft 365 Education – oit.ua.edu | The University of Alabama"/>
+          <p:cNvPr id="113" name="Imagem 112"/>
           <p:cNvPicPr/>
           <p:nvPr/>
         </p:nvPicPr>
@@ -7537,8 +7753,8 @@
         </p:blipFill>
         <p:spPr>
           <a:xfrm>
-            <a:off x="5486400" y="4585320"/>
-            <a:ext cx="1218600" cy="1218600"/>
+            <a:off x="402120" y="540000"/>
+            <a:ext cx="11376720" cy="5759640"/>
           </a:xfrm>
           <a:prstGeom prst="rect">
             <a:avLst/>
@@ -7575,7 +7791,7 @@
       </p:grpSpPr>
       <p:pic>
         <p:nvPicPr>
-          <p:cNvPr id="113" name="Imagem 112"/>
+          <p:cNvPr id="114" name="Imagem 113"/>
           <p:cNvPicPr/>
           <p:nvPr/>
         </p:nvPicPr>
@@ -7585,8 +7801,8 @@
         </p:blipFill>
         <p:spPr>
           <a:xfrm>
-            <a:off x="402120" y="540000"/>
-            <a:ext cx="11376720" cy="5759640"/>
+            <a:off x="720000" y="270720"/>
+            <a:ext cx="10718640" cy="6028920"/>
           </a:xfrm>
           <a:prstGeom prst="rect">
             <a:avLst/>
@@ -7607,6 +7823,14 @@
 <file path=ppt/slides/slide8.xml><?xml version="1.0" encoding="utf-8"?>
 <p:sld xmlns:a="http://schemas.openxmlformats.org/drawingml/2006/main" xmlns:r="http://schemas.openxmlformats.org/officeDocument/2006/relationships" xmlns:p="http://schemas.openxmlformats.org/presentationml/2006/main">
   <p:cSld>
+    <p:bg>
+      <p:bgPr>
+        <a:solidFill>
+          <a:schemeClr val="accent1"/>
+        </a:solidFill>
+        <a:effectLst/>
+      </p:bgPr>
+    </p:bg>
     <p:spTree>
       <p:nvGrpSpPr>
         <p:cNvPr id="1" name=""/>
@@ -7623,27 +7847,158 @@
       </p:grpSpPr>
       <p:pic>
         <p:nvPicPr>
-          <p:cNvPr id="114" name="Imagem 113"/>
-          <p:cNvPicPr/>
+          <p:cNvPr id="3" name="Imagem 2">
+            <a:extLst>
+              <a:ext uri="{FF2B5EF4-FFF2-40B4-BE49-F238E27FC236}">
+                <a16:creationId xmlns:a16="http://schemas.microsoft.com/office/drawing/2014/main" id="{3CCC12E2-289A-41A6-868E-DB3C0C16CEE0}"/>
+              </a:ext>
+            </a:extLst>
+          </p:cNvPr>
+          <p:cNvPicPr>
+            <a:picLocks noChangeAspect="1"/>
+          </p:cNvPicPr>
           <p:nvPr/>
         </p:nvPicPr>
         <p:blipFill>
-          <a:blip r:embed="rId2"/>
-          <a:stretch/>
+          <a:blip r:embed="rId2">
+            <a:extLst>
+              <a:ext uri="{28A0092B-C50C-407E-A947-70E740481C1C}">
+                <a14:useLocalDpi xmlns:a14="http://schemas.microsoft.com/office/drawing/2010/main" val="0"/>
+              </a:ext>
+            </a:extLst>
+          </a:blip>
+          <a:stretch>
+            <a:fillRect/>
+          </a:stretch>
         </p:blipFill>
         <p:spPr>
           <a:xfrm>
-            <a:off x="720000" y="270720"/>
-            <a:ext cx="10718640" cy="6028920"/>
-          </a:xfrm>
-          <a:prstGeom prst="rect">
-            <a:avLst/>
-          </a:prstGeom>
-          <a:ln>
-            <a:noFill/>
-          </a:ln>
+            <a:off x="364432" y="1585216"/>
+            <a:ext cx="5731568" cy="3687568"/>
+          </a:xfrm>
+          <a:prstGeom prst="rect">
+            <a:avLst/>
+          </a:prstGeom>
         </p:spPr>
       </p:pic>
+      <p:pic>
+        <p:nvPicPr>
+          <p:cNvPr id="5" name="Imagem 4">
+            <a:extLst>
+              <a:ext uri="{FF2B5EF4-FFF2-40B4-BE49-F238E27FC236}">
+                <a16:creationId xmlns:a16="http://schemas.microsoft.com/office/drawing/2014/main" id="{8081CCFD-19CD-4CFF-80DD-D298B6618332}"/>
+              </a:ext>
+            </a:extLst>
+          </p:cNvPr>
+          <p:cNvPicPr>
+            <a:picLocks noChangeAspect="1"/>
+          </p:cNvPicPr>
+          <p:nvPr/>
+        </p:nvPicPr>
+        <p:blipFill>
+          <a:blip r:embed="rId3">
+            <a:extLst>
+              <a:ext uri="{28A0092B-C50C-407E-A947-70E740481C1C}">
+                <a14:useLocalDpi xmlns:a14="http://schemas.microsoft.com/office/drawing/2010/main" val="0"/>
+              </a:ext>
+            </a:extLst>
+          </a:blip>
+          <a:stretch>
+            <a:fillRect/>
+          </a:stretch>
+        </p:blipFill>
+        <p:spPr>
+          <a:xfrm>
+            <a:off x="6212954" y="247871"/>
+            <a:ext cx="5665661" cy="3181129"/>
+          </a:xfrm>
+          <a:prstGeom prst="rect">
+            <a:avLst/>
+          </a:prstGeom>
+        </p:spPr>
+      </p:pic>
+      <p:pic>
+        <p:nvPicPr>
+          <p:cNvPr id="7" name="Imagem 6">
+            <a:extLst>
+              <a:ext uri="{FF2B5EF4-FFF2-40B4-BE49-F238E27FC236}">
+                <a16:creationId xmlns:a16="http://schemas.microsoft.com/office/drawing/2014/main" id="{CC554959-7EB8-4745-8FA9-2D7A92BE6EEF}"/>
+              </a:ext>
+            </a:extLst>
+          </p:cNvPr>
+          <p:cNvPicPr>
+            <a:picLocks noChangeAspect="1"/>
+          </p:cNvPicPr>
+          <p:nvPr/>
+        </p:nvPicPr>
+        <p:blipFill>
+          <a:blip r:embed="rId4">
+            <a:extLst>
+              <a:ext uri="{28A0092B-C50C-407E-A947-70E740481C1C}">
+                <a14:useLocalDpi xmlns:a14="http://schemas.microsoft.com/office/drawing/2010/main" val="0"/>
+              </a:ext>
+            </a:extLst>
+          </a:blip>
+          <a:stretch>
+            <a:fillRect/>
+          </a:stretch>
+        </p:blipFill>
+        <p:spPr>
+          <a:xfrm>
+            <a:off x="6502295" y="3620119"/>
+            <a:ext cx="5325273" cy="2990010"/>
+          </a:xfrm>
+          <a:prstGeom prst="rect">
+            <a:avLst/>
+          </a:prstGeom>
+        </p:spPr>
+      </p:pic>
+      <p:sp>
+        <p:nvSpPr>
+          <p:cNvPr id="8" name="CaixaDeTexto 7">
+            <a:extLst>
+              <a:ext uri="{FF2B5EF4-FFF2-40B4-BE49-F238E27FC236}">
+                <a16:creationId xmlns:a16="http://schemas.microsoft.com/office/drawing/2014/main" id="{3683A149-A0FD-4417-B361-00813AD3FA11}"/>
+              </a:ext>
+            </a:extLst>
+          </p:cNvPr>
+          <p:cNvSpPr txBox="1"/>
+          <p:nvPr/>
+        </p:nvSpPr>
+        <p:spPr>
+          <a:xfrm>
+            <a:off x="364432" y="464234"/>
+            <a:ext cx="3926214" cy="830997"/>
+          </a:xfrm>
+          <a:prstGeom prst="rect">
+            <a:avLst/>
+          </a:prstGeom>
+          <a:noFill/>
+        </p:spPr>
+        <p:txBody>
+          <a:bodyPr wrap="square" rtlCol="0">
+            <a:spAutoFit/>
+          </a:bodyPr>
+          <a:lstStyle/>
+          <a:p>
+            <a:r>
+              <a:rPr lang="pt-BR" sz="4800" dirty="0" err="1">
+                <a:solidFill>
+                  <a:schemeClr val="bg2"/>
+                </a:solidFill>
+                <a:latin typeface="思源黑体 CN Bold"/>
+              </a:rPr>
+              <a:t>Mockup’s</a:t>
+            </a:r>
+            <a:endParaRPr lang="pt-BR" sz="4800" dirty="0">
+              <a:solidFill>
+                <a:schemeClr val="bg2"/>
+              </a:solidFill>
+              <a:latin typeface="思源黑体 CN Bold"/>
+            </a:endParaRPr>
+          </a:p>
+        </p:txBody>
+      </p:sp>
     </p:spTree>
   </p:cSld>
   <p:clrMapOvr>
@@ -7682,7 +8037,7 @@
           <p:cNvPr id="3" name="Imagem 2">
             <a:extLst>
               <a:ext uri="{FF2B5EF4-FFF2-40B4-BE49-F238E27FC236}">
-                <a16:creationId xmlns:a16="http://schemas.microsoft.com/office/drawing/2014/main" id="{3CCC12E2-289A-41A6-868E-DB3C0C16CEE0}"/>
+                <a16:creationId xmlns:a16="http://schemas.microsoft.com/office/drawing/2014/main" id="{9A320181-E292-4A81-A246-392F2408E34D}"/>
               </a:ext>
             </a:extLst>
           </p:cNvPr>
@@ -7705,8 +8060,8 @@
         </p:blipFill>
         <p:spPr>
           <a:xfrm>
-            <a:off x="364432" y="1585216"/>
-            <a:ext cx="5731568" cy="3687568"/>
+            <a:off x="237974" y="483369"/>
+            <a:ext cx="6739602" cy="3560232"/>
           </a:xfrm>
           <a:prstGeom prst="rect">
             <a:avLst/>
@@ -7718,7 +8073,7 @@
           <p:cNvPr id="5" name="Imagem 4">
             <a:extLst>
               <a:ext uri="{FF2B5EF4-FFF2-40B4-BE49-F238E27FC236}">
-                <a16:creationId xmlns:a16="http://schemas.microsoft.com/office/drawing/2014/main" id="{8081CCFD-19CD-4CFF-80DD-D298B6618332}"/>
+                <a16:creationId xmlns:a16="http://schemas.microsoft.com/office/drawing/2014/main" id="{04D4BDE5-E4E9-4E86-B1AB-FB13F6D3A21C}"/>
               </a:ext>
             </a:extLst>
           </p:cNvPr>
@@ -7741,96 +8096,14 @@
         </p:blipFill>
         <p:spPr>
           <a:xfrm>
-            <a:off x="6212954" y="247871"/>
-            <a:ext cx="5665661" cy="3181129"/>
+            <a:off x="6330244" y="2989520"/>
+            <a:ext cx="5261461" cy="3385111"/>
           </a:xfrm>
           <a:prstGeom prst="rect">
             <a:avLst/>
           </a:prstGeom>
         </p:spPr>
       </p:pic>
-      <p:pic>
-        <p:nvPicPr>
-          <p:cNvPr id="7" name="Imagem 6">
-            <a:extLst>
-              <a:ext uri="{FF2B5EF4-FFF2-40B4-BE49-F238E27FC236}">
-                <a16:creationId xmlns:a16="http://schemas.microsoft.com/office/drawing/2014/main" id="{CC554959-7EB8-4745-8FA9-2D7A92BE6EEF}"/>
-              </a:ext>
-            </a:extLst>
-          </p:cNvPr>
-          <p:cNvPicPr>
-            <a:picLocks noChangeAspect="1"/>
-          </p:cNvPicPr>
-          <p:nvPr/>
-        </p:nvPicPr>
-        <p:blipFill>
-          <a:blip r:embed="rId4">
-            <a:extLst>
-              <a:ext uri="{28A0092B-C50C-407E-A947-70E740481C1C}">
-                <a14:useLocalDpi xmlns:a14="http://schemas.microsoft.com/office/drawing/2010/main" val="0"/>
-              </a:ext>
-            </a:extLst>
-          </a:blip>
-          <a:stretch>
-            <a:fillRect/>
-          </a:stretch>
-        </p:blipFill>
-        <p:spPr>
-          <a:xfrm>
-            <a:off x="6502295" y="3620119"/>
-            <a:ext cx="5325273" cy="2990010"/>
-          </a:xfrm>
-          <a:prstGeom prst="rect">
-            <a:avLst/>
-          </a:prstGeom>
-        </p:spPr>
-      </p:pic>
-      <p:sp>
-        <p:nvSpPr>
-          <p:cNvPr id="8" name="CaixaDeTexto 7">
-            <a:extLst>
-              <a:ext uri="{FF2B5EF4-FFF2-40B4-BE49-F238E27FC236}">
-                <a16:creationId xmlns:a16="http://schemas.microsoft.com/office/drawing/2014/main" id="{3683A149-A0FD-4417-B361-00813AD3FA11}"/>
-              </a:ext>
-            </a:extLst>
-          </p:cNvPr>
-          <p:cNvSpPr txBox="1"/>
-          <p:nvPr/>
-        </p:nvSpPr>
-        <p:spPr>
-          <a:xfrm>
-            <a:off x="364432" y="464234"/>
-            <a:ext cx="3926214" cy="830997"/>
-          </a:xfrm>
-          <a:prstGeom prst="rect">
-            <a:avLst/>
-          </a:prstGeom>
-          <a:noFill/>
-        </p:spPr>
-        <p:txBody>
-          <a:bodyPr wrap="square" rtlCol="0">
-            <a:spAutoFit/>
-          </a:bodyPr>
-          <a:lstStyle/>
-          <a:p>
-            <a:r>
-              <a:rPr lang="pt-BR" sz="4800" dirty="0" err="1">
-                <a:solidFill>
-                  <a:schemeClr val="bg2"/>
-                </a:solidFill>
-                <a:latin typeface="思源黑体 CN Bold"/>
-              </a:rPr>
-              <a:t>Mockup’s</a:t>
-            </a:r>
-            <a:endParaRPr lang="pt-BR" sz="4800" dirty="0">
-              <a:solidFill>
-                <a:schemeClr val="bg2"/>
-              </a:solidFill>
-              <a:latin typeface="思源黑体 CN Bold"/>
-            </a:endParaRPr>
-          </a:p>
-        </p:txBody>
-      </p:sp>
     </p:spTree>
   </p:cSld>
   <p:clrMapOvr>

</xml_diff>